<commit_message>
Update based on September 2022 class
</commit_message>
<xml_diff>
--- a/presentation/Class_7_Graphics/Class_7_Graphics.pptx
+++ b/presentation/Class_7_Graphics/Class_7_Graphics.pptx
@@ -5,7 +5,7 @@
     <p:sldMasterId id="2147483660" r:id="rId1"/>
   </p:sldMasterIdLst>
   <p:notesMasterIdLst>
-    <p:notesMasterId r:id="rId19"/>
+    <p:notesMasterId r:id="rId20"/>
   </p:notesMasterIdLst>
   <p:sldIdLst>
     <p:sldId id="411" r:id="rId2"/>
@@ -17,14 +17,15 @@
     <p:sldId id="414" r:id="rId8"/>
     <p:sldId id="417" r:id="rId9"/>
     <p:sldId id="415" r:id="rId10"/>
-    <p:sldId id="418" r:id="rId11"/>
-    <p:sldId id="419" r:id="rId12"/>
-    <p:sldId id="420" r:id="rId13"/>
-    <p:sldId id="421" r:id="rId14"/>
-    <p:sldId id="422" r:id="rId15"/>
-    <p:sldId id="423" r:id="rId16"/>
-    <p:sldId id="424" r:id="rId17"/>
-    <p:sldId id="425" r:id="rId18"/>
+    <p:sldId id="427" r:id="rId11"/>
+    <p:sldId id="418" r:id="rId12"/>
+    <p:sldId id="419" r:id="rId13"/>
+    <p:sldId id="420" r:id="rId14"/>
+    <p:sldId id="421" r:id="rId15"/>
+    <p:sldId id="422" r:id="rId16"/>
+    <p:sldId id="423" r:id="rId17"/>
+    <p:sldId id="424" r:id="rId18"/>
+    <p:sldId id="425" r:id="rId19"/>
   </p:sldIdLst>
   <p:sldSz cx="12192000" cy="6858000"/>
   <p:notesSz cx="6858000" cy="9144000"/>
@@ -213,7 +214,7 @@
           <a:p>
             <a:fld id="{656D2E9F-587F-4929-A615-D1B22C008AE4}" type="datetimeFigureOut">
               <a:rPr lang="en-US" smtClean="0"/>
-              <a:t>8/6/2022</a:t>
+              <a:t>10/21/2022</a:t>
             </a:fld>
             <a:endParaRPr lang="en-US" dirty="0"/>
           </a:p>
@@ -644,7 +645,7 @@
                 <a:tabLst/>
                 <a:defRPr/>
               </a:pPr>
-              <a:t>8/6/2022</a:t>
+              <a:t>10/21/2022</a:t>
             </a:fld>
             <a:endParaRPr kumimoji="0" lang="en-US" sz="1200" b="0" i="0" u="none" strike="noStrike" kern="1200" cap="none" spc="0" normalizeH="0" baseline="0" noProof="0" dirty="0">
               <a:ln>
@@ -857,15 +858,14 @@
           <a:p>
             <a:r>
               <a:rPr lang="en-US" dirty="0"/>
-              <a:t>Options </a:t>
-            </a:r>
-            <a:r>
-              <a:rPr lang="en-US" dirty="0">
-                <a:sym typeface="Wingdings" panose="05000000000000000000" pitchFamily="2" charset="2"/>
-              </a:rPr>
-              <a:t> Show Line Numbers</a:t>
-            </a:r>
-            <a:endParaRPr lang="en-US" dirty="0"/>
+              <a:t>Like life programs, of almost any complexity, will have problems – they often do not operate as desired/expected.</a:t>
+            </a:r>
+          </a:p>
+          <a:p>
+            <a:r>
+              <a:rPr lang="en-US" dirty="0"/>
+              <a:t>Good News – finding and fixing them is often easy and even fun.</a:t>
+            </a:r>
           </a:p>
         </p:txBody>
       </p:sp>
@@ -985,7 +985,7 @@
                 <a:tabLst/>
                 <a:defRPr/>
               </a:pPr>
-              <a:t>8/6/2022</a:t>
+              <a:t>10/21/2022</a:t>
             </a:fld>
             <a:endParaRPr kumimoji="0" lang="en-US" sz="1200" b="0" i="0" u="none" strike="noStrike" kern="1200" cap="none" spc="0" normalizeH="0" baseline="0" noProof="0" dirty="0">
               <a:ln>
@@ -1142,7 +1142,7 @@
     </p:spTree>
     <p:extLst>
       <p:ext uri="{BB962C8B-B14F-4D97-AF65-F5344CB8AC3E}">
-        <p14:creationId xmlns:p14="http://schemas.microsoft.com/office/powerpoint/2010/main" val="1479861876"/>
+        <p14:creationId xmlns:p14="http://schemas.microsoft.com/office/powerpoint/2010/main" val="4037827283"/>
       </p:ext>
     </p:extLst>
   </p:cSld>
@@ -1196,6 +1196,16 @@
           <a:bodyPr/>
           <a:lstStyle/>
           <a:p>
+            <a:r>
+              <a:rPr lang="en-US" dirty="0"/>
+              <a:t>Options </a:t>
+            </a:r>
+            <a:r>
+              <a:rPr lang="en-US" dirty="0">
+                <a:sym typeface="Wingdings" panose="05000000000000000000" pitchFamily="2" charset="2"/>
+              </a:rPr>
+              <a:t> Show Line Numbers</a:t>
+            </a:r>
             <a:endParaRPr lang="en-US" dirty="0"/>
           </a:p>
         </p:txBody>
@@ -1316,7 +1326,7 @@
                 <a:tabLst/>
                 <a:defRPr/>
               </a:pPr>
-              <a:t>8/6/2022</a:t>
+              <a:t>10/21/2022</a:t>
             </a:fld>
             <a:endParaRPr kumimoji="0" lang="en-US" sz="1200" b="0" i="0" u="none" strike="noStrike" kern="1200" cap="none" spc="0" normalizeH="0" baseline="0" noProof="0" dirty="0">
               <a:ln>
@@ -1473,7 +1483,7 @@
     </p:spTree>
     <p:extLst>
       <p:ext uri="{BB962C8B-B14F-4D97-AF65-F5344CB8AC3E}">
-        <p14:creationId xmlns:p14="http://schemas.microsoft.com/office/powerpoint/2010/main" val="1348787653"/>
+        <p14:creationId xmlns:p14="http://schemas.microsoft.com/office/powerpoint/2010/main" val="1479861876"/>
       </p:ext>
     </p:extLst>
   </p:cSld>
@@ -1647,7 +1657,7 @@
                 <a:tabLst/>
                 <a:defRPr/>
               </a:pPr>
-              <a:t>8/6/2022</a:t>
+              <a:t>10/21/2022</a:t>
             </a:fld>
             <a:endParaRPr kumimoji="0" lang="en-US" sz="1200" b="0" i="0" u="none" strike="noStrike" kern="1200" cap="none" spc="0" normalizeH="0" baseline="0" noProof="0" dirty="0">
               <a:ln>
@@ -1804,7 +1814,7 @@
     </p:spTree>
     <p:extLst>
       <p:ext uri="{BB962C8B-B14F-4D97-AF65-F5344CB8AC3E}">
-        <p14:creationId xmlns:p14="http://schemas.microsoft.com/office/powerpoint/2010/main" val="3430223949"/>
+        <p14:creationId xmlns:p14="http://schemas.microsoft.com/office/powerpoint/2010/main" val="1348787653"/>
       </p:ext>
     </p:extLst>
   </p:cSld>
@@ -1978,7 +1988,7 @@
                 <a:tabLst/>
                 <a:defRPr/>
               </a:pPr>
-              <a:t>8/6/2022</a:t>
+              <a:t>10/21/2022</a:t>
             </a:fld>
             <a:endParaRPr kumimoji="0" lang="en-US" sz="1200" b="0" i="0" u="none" strike="noStrike" kern="1200" cap="none" spc="0" normalizeH="0" baseline="0" noProof="0" dirty="0">
               <a:ln>
@@ -2135,7 +2145,7 @@
     </p:spTree>
     <p:extLst>
       <p:ext uri="{BB962C8B-B14F-4D97-AF65-F5344CB8AC3E}">
-        <p14:creationId xmlns:p14="http://schemas.microsoft.com/office/powerpoint/2010/main" val="1652260314"/>
+        <p14:creationId xmlns:p14="http://schemas.microsoft.com/office/powerpoint/2010/main" val="3430223949"/>
       </p:ext>
     </p:extLst>
   </p:cSld>
@@ -2309,7 +2319,7 @@
                 <a:tabLst/>
                 <a:defRPr/>
               </a:pPr>
-              <a:t>8/6/2022</a:t>
+              <a:t>10/21/2022</a:t>
             </a:fld>
             <a:endParaRPr kumimoji="0" lang="en-US" sz="1200" b="0" i="0" u="none" strike="noStrike" kern="1200" cap="none" spc="0" normalizeH="0" baseline="0" noProof="0" dirty="0">
               <a:ln>
@@ -2466,7 +2476,7 @@
     </p:spTree>
     <p:extLst>
       <p:ext uri="{BB962C8B-B14F-4D97-AF65-F5344CB8AC3E}">
-        <p14:creationId xmlns:p14="http://schemas.microsoft.com/office/powerpoint/2010/main" val="3270664559"/>
+        <p14:creationId xmlns:p14="http://schemas.microsoft.com/office/powerpoint/2010/main" val="1652260314"/>
       </p:ext>
     </p:extLst>
   </p:cSld>
@@ -2640,7 +2650,7 @@
                 <a:tabLst/>
                 <a:defRPr/>
               </a:pPr>
-              <a:t>8/6/2022</a:t>
+              <a:t>10/21/2022</a:t>
             </a:fld>
             <a:endParaRPr kumimoji="0" lang="en-US" sz="1200" b="0" i="0" u="none" strike="noStrike" kern="1200" cap="none" spc="0" normalizeH="0" baseline="0" noProof="0" dirty="0">
               <a:ln>
@@ -2797,7 +2807,7 @@
     </p:spTree>
     <p:extLst>
       <p:ext uri="{BB962C8B-B14F-4D97-AF65-F5344CB8AC3E}">
-        <p14:creationId xmlns:p14="http://schemas.microsoft.com/office/powerpoint/2010/main" val="111356619"/>
+        <p14:creationId xmlns:p14="http://schemas.microsoft.com/office/powerpoint/2010/main" val="3270664559"/>
       </p:ext>
     </p:extLst>
   </p:cSld>
@@ -2971,7 +2981,7 @@
                 <a:tabLst/>
                 <a:defRPr/>
               </a:pPr>
-              <a:t>8/6/2022</a:t>
+              <a:t>10/21/2022</a:t>
             </a:fld>
             <a:endParaRPr kumimoji="0" lang="en-US" sz="1200" b="0" i="0" u="none" strike="noStrike" kern="1200" cap="none" spc="0" normalizeH="0" baseline="0" noProof="0" dirty="0">
               <a:ln>
@@ -3128,6 +3138,337 @@
     </p:spTree>
     <p:extLst>
       <p:ext uri="{BB962C8B-B14F-4D97-AF65-F5344CB8AC3E}">
+        <p14:creationId xmlns:p14="http://schemas.microsoft.com/office/powerpoint/2010/main" val="111356619"/>
+      </p:ext>
+    </p:extLst>
+  </p:cSld>
+  <p:clrMapOvr>
+    <a:masterClrMapping/>
+  </p:clrMapOvr>
+</p:notes>
+</file>
+
+<file path=ppt/notesSlides/notesSlide17.xml><?xml version="1.0" encoding="utf-8"?>
+<p:notes xmlns:a="http://schemas.openxmlformats.org/drawingml/2006/main" xmlns:r="http://schemas.openxmlformats.org/officeDocument/2006/relationships" xmlns:p="http://schemas.openxmlformats.org/presentationml/2006/main">
+  <p:cSld>
+    <p:spTree>
+      <p:nvGrpSpPr>
+        <p:cNvPr id="1" name=""/>
+        <p:cNvGrpSpPr/>
+        <p:nvPr/>
+      </p:nvGrpSpPr>
+      <p:grpSpPr>
+        <a:xfrm>
+          <a:off x="0" y="0"/>
+          <a:ext cx="0" cy="0"/>
+          <a:chOff x="0" y="0"/>
+          <a:chExt cx="0" cy="0"/>
+        </a:xfrm>
+      </p:grpSpPr>
+      <p:sp>
+        <p:nvSpPr>
+          <p:cNvPr id="2" name="Slide Image Placeholder 1"/>
+          <p:cNvSpPr>
+            <a:spLocks noGrp="1" noRot="1" noChangeAspect="1"/>
+          </p:cNvSpPr>
+          <p:nvPr>
+            <p:ph type="sldImg"/>
+          </p:nvPr>
+        </p:nvSpPr>
+        <p:spPr/>
+      </p:sp>
+      <p:sp>
+        <p:nvSpPr>
+          <p:cNvPr id="3" name="Notes Placeholder 2"/>
+          <p:cNvSpPr>
+            <a:spLocks noGrp="1"/>
+          </p:cNvSpPr>
+          <p:nvPr>
+            <p:ph type="body" idx="1"/>
+          </p:nvPr>
+        </p:nvSpPr>
+        <p:spPr/>
+        <p:txBody>
+          <a:bodyPr/>
+          <a:lstStyle/>
+          <a:p>
+            <a:endParaRPr lang="en-US" dirty="0"/>
+          </a:p>
+        </p:txBody>
+      </p:sp>
+      <p:sp>
+        <p:nvSpPr>
+          <p:cNvPr id="4" name="Header Placeholder 3"/>
+          <p:cNvSpPr>
+            <a:spLocks noGrp="1"/>
+          </p:cNvSpPr>
+          <p:nvPr>
+            <p:ph type="hdr" sz="quarter"/>
+          </p:nvPr>
+        </p:nvSpPr>
+        <p:spPr/>
+        <p:txBody>
+          <a:bodyPr/>
+          <a:lstStyle/>
+          <a:p>
+            <a:pPr marL="0" marR="0" lvl="0" indent="0" algn="l" defTabSz="457200" rtl="0" eaLnBrk="1" fontAlgn="auto" latinLnBrk="0" hangingPunct="1">
+              <a:lnSpc>
+                <a:spcPct val="100000"/>
+              </a:lnSpc>
+              <a:spcBef>
+                <a:spcPts val="0"/>
+              </a:spcBef>
+              <a:spcAft>
+                <a:spcPts val="0"/>
+              </a:spcAft>
+              <a:buClrTx/>
+              <a:buSzTx/>
+              <a:buFontTx/>
+              <a:buNone/>
+              <a:tabLst/>
+              <a:defRPr/>
+            </a:pPr>
+            <a:r>
+              <a:rPr kumimoji="0" lang="en-US" sz="1200" b="0" i="0" u="none" strike="noStrike" kern="1200" cap="none" spc="0" normalizeH="0" baseline="0" noProof="0" dirty="0">
+                <a:ln>
+                  <a:noFill/>
+                </a:ln>
+                <a:solidFill>
+                  <a:prstClr val="black"/>
+                </a:solidFill>
+                <a:effectLst/>
+                <a:uLnTx/>
+                <a:uFillTx/>
+                <a:latin typeface="Calibri" panose="020F0502020204030204"/>
+                <a:ea typeface="+mn-ea"/>
+                <a:cs typeface="+mn-cs"/>
+              </a:rPr>
+              <a:t>Introduction to Programming using Python</a:t>
+            </a:r>
+          </a:p>
+        </p:txBody>
+      </p:sp>
+      <p:sp>
+        <p:nvSpPr>
+          <p:cNvPr id="5" name="Date Placeholder 4"/>
+          <p:cNvSpPr>
+            <a:spLocks noGrp="1"/>
+          </p:cNvSpPr>
+          <p:nvPr>
+            <p:ph type="dt" idx="1"/>
+          </p:nvPr>
+        </p:nvSpPr>
+        <p:spPr/>
+        <p:txBody>
+          <a:bodyPr/>
+          <a:lstStyle/>
+          <a:p>
+            <a:pPr marL="0" marR="0" lvl="0" indent="0" algn="r" defTabSz="457200" rtl="0" eaLnBrk="1" fontAlgn="auto" latinLnBrk="0" hangingPunct="1">
+              <a:lnSpc>
+                <a:spcPct val="100000"/>
+              </a:lnSpc>
+              <a:spcBef>
+                <a:spcPts val="0"/>
+              </a:spcBef>
+              <a:spcAft>
+                <a:spcPts val="0"/>
+              </a:spcAft>
+              <a:buClrTx/>
+              <a:buSzTx/>
+              <a:buFontTx/>
+              <a:buNone/>
+              <a:tabLst/>
+              <a:defRPr/>
+            </a:pPr>
+            <a:fld id="{A596092B-28C7-44D1-B902-5437B333DFB7}" type="datetime1">
+              <a:rPr kumimoji="0" lang="en-US" sz="1200" b="0" i="0" u="none" strike="noStrike" kern="1200" cap="none" spc="0" normalizeH="0" baseline="0" noProof="0" smtClean="0">
+                <a:ln>
+                  <a:noFill/>
+                </a:ln>
+                <a:solidFill>
+                  <a:prstClr val="black"/>
+                </a:solidFill>
+                <a:effectLst/>
+                <a:uLnTx/>
+                <a:uFillTx/>
+                <a:latin typeface="Calibri" panose="020F0502020204030204"/>
+                <a:ea typeface="+mn-ea"/>
+                <a:cs typeface="+mn-cs"/>
+              </a:rPr>
+              <a:pPr marL="0" marR="0" lvl="0" indent="0" algn="r" defTabSz="457200" rtl="0" eaLnBrk="1" fontAlgn="auto" latinLnBrk="0" hangingPunct="1">
+                <a:lnSpc>
+                  <a:spcPct val="100000"/>
+                </a:lnSpc>
+                <a:spcBef>
+                  <a:spcPts val="0"/>
+                </a:spcBef>
+                <a:spcAft>
+                  <a:spcPts val="0"/>
+                </a:spcAft>
+                <a:buClrTx/>
+                <a:buSzTx/>
+                <a:buFontTx/>
+                <a:buNone/>
+                <a:tabLst/>
+                <a:defRPr/>
+              </a:pPr>
+              <a:t>10/21/2022</a:t>
+            </a:fld>
+            <a:endParaRPr kumimoji="0" lang="en-US" sz="1200" b="0" i="0" u="none" strike="noStrike" kern="1200" cap="none" spc="0" normalizeH="0" baseline="0" noProof="0" dirty="0">
+              <a:ln>
+                <a:noFill/>
+              </a:ln>
+              <a:solidFill>
+                <a:prstClr val="black"/>
+              </a:solidFill>
+              <a:effectLst/>
+              <a:uLnTx/>
+              <a:uFillTx/>
+              <a:latin typeface="Calibri" panose="020F0502020204030204"/>
+              <a:ea typeface="+mn-ea"/>
+              <a:cs typeface="+mn-cs"/>
+            </a:endParaRPr>
+          </a:p>
+        </p:txBody>
+      </p:sp>
+      <p:sp>
+        <p:nvSpPr>
+          <p:cNvPr id="6" name="Footer Placeholder 5"/>
+          <p:cNvSpPr>
+            <a:spLocks noGrp="1"/>
+          </p:cNvSpPr>
+          <p:nvPr>
+            <p:ph type="ftr" sz="quarter" idx="4"/>
+          </p:nvPr>
+        </p:nvSpPr>
+        <p:spPr/>
+        <p:txBody>
+          <a:bodyPr/>
+          <a:lstStyle/>
+          <a:p>
+            <a:pPr marL="0" marR="0" lvl="0" indent="0" algn="l" defTabSz="457200" rtl="0" eaLnBrk="1" fontAlgn="auto" latinLnBrk="0" hangingPunct="1">
+              <a:lnSpc>
+                <a:spcPct val="100000"/>
+              </a:lnSpc>
+              <a:spcBef>
+                <a:spcPts val="0"/>
+              </a:spcBef>
+              <a:spcAft>
+                <a:spcPts val="0"/>
+              </a:spcAft>
+              <a:buClrTx/>
+              <a:buSzTx/>
+              <a:buFontTx/>
+              <a:buNone/>
+              <a:tabLst/>
+              <a:defRPr/>
+            </a:pPr>
+            <a:r>
+              <a:rPr kumimoji="0" lang="en-US" sz="1200" b="0" i="0" u="none" strike="noStrike" kern="1200" cap="none" spc="0" normalizeH="0" baseline="0" noProof="0" dirty="0">
+                <a:ln>
+                  <a:noFill/>
+                </a:ln>
+                <a:solidFill>
+                  <a:prstClr val="black"/>
+                </a:solidFill>
+                <a:effectLst/>
+                <a:uLnTx/>
+                <a:uFillTx/>
+                <a:latin typeface="Calibri" panose="020F0502020204030204"/>
+                <a:ea typeface="+mn-ea"/>
+                <a:cs typeface="+mn-cs"/>
+              </a:rPr>
+              <a:t>raysmith@alum.mit.edu</a:t>
+            </a:r>
+          </a:p>
+        </p:txBody>
+      </p:sp>
+      <p:sp>
+        <p:nvSpPr>
+          <p:cNvPr id="7" name="Slide Number Placeholder 6"/>
+          <p:cNvSpPr>
+            <a:spLocks noGrp="1"/>
+          </p:cNvSpPr>
+          <p:nvPr>
+            <p:ph type="sldNum" sz="quarter" idx="5"/>
+          </p:nvPr>
+        </p:nvSpPr>
+        <p:spPr/>
+        <p:txBody>
+          <a:bodyPr/>
+          <a:lstStyle/>
+          <a:p>
+            <a:pPr marL="0" marR="0" lvl="0" indent="0" algn="r" defTabSz="457200" rtl="0" eaLnBrk="1" fontAlgn="auto" latinLnBrk="0" hangingPunct="1">
+              <a:lnSpc>
+                <a:spcPct val="100000"/>
+              </a:lnSpc>
+              <a:spcBef>
+                <a:spcPts val="0"/>
+              </a:spcBef>
+              <a:spcAft>
+                <a:spcPts val="0"/>
+              </a:spcAft>
+              <a:buClrTx/>
+              <a:buSzTx/>
+              <a:buFontTx/>
+              <a:buNone/>
+              <a:tabLst/>
+              <a:defRPr/>
+            </a:pPr>
+            <a:fld id="{BA791329-992B-4F83-8435-C33B0EC26DB3}" type="slidenum">
+              <a:rPr kumimoji="0" lang="en-US" sz="1200" b="0" i="0" u="none" strike="noStrike" kern="1200" cap="none" spc="0" normalizeH="0" baseline="0" noProof="0" smtClean="0">
+                <a:ln>
+                  <a:noFill/>
+                </a:ln>
+                <a:solidFill>
+                  <a:prstClr val="black"/>
+                </a:solidFill>
+                <a:effectLst/>
+                <a:uLnTx/>
+                <a:uFillTx/>
+                <a:latin typeface="Calibri" panose="020F0502020204030204"/>
+                <a:ea typeface="+mn-ea"/>
+                <a:cs typeface="+mn-cs"/>
+              </a:rPr>
+              <a:pPr marL="0" marR="0" lvl="0" indent="0" algn="r" defTabSz="457200" rtl="0" eaLnBrk="1" fontAlgn="auto" latinLnBrk="0" hangingPunct="1">
+                <a:lnSpc>
+                  <a:spcPct val="100000"/>
+                </a:lnSpc>
+                <a:spcBef>
+                  <a:spcPts val="0"/>
+                </a:spcBef>
+                <a:spcAft>
+                  <a:spcPts val="0"/>
+                </a:spcAft>
+                <a:buClrTx/>
+                <a:buSzTx/>
+                <a:buFontTx/>
+                <a:buNone/>
+                <a:tabLst/>
+                <a:defRPr/>
+              </a:pPr>
+              <a:t>18</a:t>
+            </a:fld>
+            <a:endParaRPr kumimoji="0" lang="en-US" sz="1200" b="0" i="0" u="none" strike="noStrike" kern="1200" cap="none" spc="0" normalizeH="0" baseline="0" noProof="0" dirty="0">
+              <a:ln>
+                <a:noFill/>
+              </a:ln>
+              <a:solidFill>
+                <a:prstClr val="black"/>
+              </a:solidFill>
+              <a:effectLst/>
+              <a:uLnTx/>
+              <a:uFillTx/>
+              <a:latin typeface="Calibri" panose="020F0502020204030204"/>
+              <a:ea typeface="+mn-ea"/>
+              <a:cs typeface="+mn-cs"/>
+            </a:endParaRPr>
+          </a:p>
+        </p:txBody>
+      </p:sp>
+    </p:spTree>
+    <p:extLst>
+      <p:ext uri="{BB962C8B-B14F-4D97-AF65-F5344CB8AC3E}">
         <p14:creationId xmlns:p14="http://schemas.microsoft.com/office/powerpoint/2010/main" val="539085961"/>
       </p:ext>
     </p:extLst>
@@ -3302,7 +3643,7 @@
                 <a:tabLst/>
                 <a:defRPr/>
               </a:pPr>
-              <a:t>8/6/2022</a:t>
+              <a:t>10/21/2022</a:t>
             </a:fld>
             <a:endParaRPr kumimoji="0" lang="en-US" sz="1200" b="0" i="0" u="none" strike="noStrike" kern="1200" cap="none" spc="0" normalizeH="0" baseline="0" noProof="0" dirty="0">
               <a:ln>
@@ -3633,7 +3974,7 @@
                 <a:tabLst/>
                 <a:defRPr/>
               </a:pPr>
-              <a:t>8/6/2022</a:t>
+              <a:t>10/21/2022</a:t>
             </a:fld>
             <a:endParaRPr kumimoji="0" lang="en-US" sz="1200" b="0" i="0" u="none" strike="noStrike" kern="1200" cap="none" spc="0" normalizeH="0" baseline="0" noProof="0" dirty="0">
               <a:ln>
@@ -3964,7 +4305,7 @@
                 <a:tabLst/>
                 <a:defRPr/>
               </a:pPr>
-              <a:t>8/6/2022</a:t>
+              <a:t>10/21/2022</a:t>
             </a:fld>
             <a:endParaRPr kumimoji="0" lang="en-US" sz="1200" b="0" i="0" u="none" strike="noStrike" kern="1200" cap="none" spc="0" normalizeH="0" baseline="0" noProof="0" dirty="0">
               <a:ln>
@@ -4295,7 +4636,7 @@
                 <a:tabLst/>
                 <a:defRPr/>
               </a:pPr>
-              <a:t>8/6/2022</a:t>
+              <a:t>10/21/2022</a:t>
             </a:fld>
             <a:endParaRPr kumimoji="0" lang="en-US" sz="1200" b="0" i="0" u="none" strike="noStrike" kern="1200" cap="none" spc="0" normalizeH="0" baseline="0" noProof="0" dirty="0">
               <a:ln>
@@ -4641,7 +4982,7 @@
                 <a:tabLst/>
                 <a:defRPr/>
               </a:pPr>
-              <a:t>8/6/2022</a:t>
+              <a:t>10/21/2022</a:t>
             </a:fld>
             <a:endParaRPr kumimoji="0" lang="en-US" sz="1200" b="0" i="0" u="none" strike="noStrike" kern="1200" cap="none" spc="0" normalizeH="0" baseline="0" noProof="0" dirty="0">
               <a:ln>
@@ -4972,7 +5313,7 @@
                 <a:tabLst/>
                 <a:defRPr/>
               </a:pPr>
-              <a:t>8/6/2022</a:t>
+              <a:t>10/21/2022</a:t>
             </a:fld>
             <a:endParaRPr kumimoji="0" lang="en-US" sz="1200" b="0" i="0" u="none" strike="noStrike" kern="1200" cap="none" spc="0" normalizeH="0" baseline="0" noProof="0" dirty="0">
               <a:ln>
@@ -5318,7 +5659,7 @@
                 <a:tabLst/>
                 <a:defRPr/>
               </a:pPr>
-              <a:t>8/6/2022</a:t>
+              <a:t>10/21/2022</a:t>
             </a:fld>
             <a:endParaRPr kumimoji="0" lang="en-US" sz="1200" b="0" i="0" u="none" strike="noStrike" kern="1200" cap="none" spc="0" normalizeH="0" baseline="0" noProof="0" dirty="0">
               <a:ln>
@@ -5531,13 +5872,19 @@
           <a:p>
             <a:r>
               <a:rPr lang="en-US" dirty="0"/>
-              <a:t>Like life programs, of almost any complexity, will have problems – they often do not operate as desired/expected.</a:t>
+              <a:t>File, as a named group of bytes is an abstraction.</a:t>
             </a:r>
           </a:p>
           <a:p>
             <a:r>
               <a:rPr lang="en-US" dirty="0"/>
-              <a:t>Good News – finding and fixing them is often easy and even fun.</a:t>
+              <a:t>Years ago the programmer needed to understand more about the structure.</a:t>
+            </a:r>
+          </a:p>
+          <a:p>
+            <a:r>
+              <a:rPr lang="en-US" dirty="0"/>
+              <a:t>Your Python program is a data file to some program(s).</a:t>
             </a:r>
           </a:p>
         </p:txBody>
@@ -5658,7 +6005,7 @@
                 <a:tabLst/>
                 <a:defRPr/>
               </a:pPr>
-              <a:t>8/6/2022</a:t>
+              <a:t>10/21/2022</a:t>
             </a:fld>
             <a:endParaRPr kumimoji="0" lang="en-US" sz="1200" b="0" i="0" u="none" strike="noStrike" kern="1200" cap="none" spc="0" normalizeH="0" baseline="0" noProof="0" dirty="0">
               <a:ln>
@@ -5815,7 +6162,7 @@
     </p:spTree>
     <p:extLst>
       <p:ext uri="{BB962C8B-B14F-4D97-AF65-F5344CB8AC3E}">
-        <p14:creationId xmlns:p14="http://schemas.microsoft.com/office/powerpoint/2010/main" val="4037827283"/>
+        <p14:creationId xmlns:p14="http://schemas.microsoft.com/office/powerpoint/2010/main" val="2162320141"/>
       </p:ext>
     </p:extLst>
   </p:cSld>
@@ -6547,7 +6894,7 @@
           <a:p>
             <a:fld id="{B1DF5501-EE91-4443-9D3B-24E6F28D34E2}" type="datetime1">
               <a:rPr lang="en-US" smtClean="0"/>
-              <a:t>8/6/2022</a:t>
+              <a:t>10/21/2022</a:t>
             </a:fld>
             <a:endParaRPr lang="en-US" dirty="0"/>
           </a:p>
@@ -6813,7 +7160,7 @@
           <a:p>
             <a:fld id="{E954E1E9-8456-43AD-BA28-861520D256B9}" type="datetime1">
               <a:rPr lang="en-US" smtClean="0"/>
-              <a:t>8/6/2022</a:t>
+              <a:t>10/21/2022</a:t>
             </a:fld>
             <a:endParaRPr lang="en-US" dirty="0"/>
           </a:p>
@@ -7131,7 +7478,7 @@
           <a:p>
             <a:fld id="{FAF31E0C-AAFD-4E63-B3AE-16CD757951F4}" type="datetime1">
               <a:rPr lang="en-US" smtClean="0"/>
-              <a:t>8/6/2022</a:t>
+              <a:t>10/21/2022</a:t>
             </a:fld>
             <a:endParaRPr lang="en-US" dirty="0"/>
           </a:p>
@@ -7476,7 +7823,7 @@
           <a:p>
             <a:fld id="{000084FF-4715-4B6E-BD22-453621E5873F}" type="datetime1">
               <a:rPr lang="en-US" smtClean="0"/>
-              <a:t>8/6/2022</a:t>
+              <a:t>10/21/2022</a:t>
             </a:fld>
             <a:endParaRPr lang="en-US" dirty="0"/>
           </a:p>
@@ -7794,7 +8141,7 @@
           <a:p>
             <a:fld id="{6AC37F8D-4DF5-4AB6-A766-5A84B3D74A3B}" type="datetime1">
               <a:rPr lang="en-US" smtClean="0"/>
-              <a:t>8/6/2022</a:t>
+              <a:t>10/21/2022</a:t>
             </a:fld>
             <a:endParaRPr lang="en-US" dirty="0"/>
           </a:p>
@@ -8191,7 +8538,7 @@
           <a:p>
             <a:fld id="{1BF3CD1A-162D-40B2-9B22-9056F77C27F2}" type="datetime1">
               <a:rPr lang="en-US" smtClean="0"/>
-              <a:t>8/6/2022</a:t>
+              <a:t>10/21/2022</a:t>
             </a:fld>
             <a:endParaRPr lang="en-US" dirty="0"/>
           </a:p>
@@ -8365,7 +8712,7 @@
           <a:p>
             <a:fld id="{D42E4200-B1E5-4E39-8279-05DD69810A37}" type="datetime1">
               <a:rPr lang="en-US" smtClean="0"/>
-              <a:t>8/6/2022</a:t>
+              <a:t>10/21/2022</a:t>
             </a:fld>
             <a:endParaRPr lang="en-US" dirty="0"/>
           </a:p>
@@ -8548,7 +8895,7 @@
           <a:p>
             <a:fld id="{47CF7895-00AC-42E5-9790-7B0E3CE09DF2}" type="datetime1">
               <a:rPr lang="en-US" smtClean="0"/>
-              <a:t>8/6/2022</a:t>
+              <a:t>10/21/2022</a:t>
             </a:fld>
             <a:endParaRPr lang="en-US" dirty="0"/>
           </a:p>
@@ -8727,7 +9074,7 @@
           <a:p>
             <a:fld id="{A7119916-CD40-456D-ABE3-55F8822671F7}" type="datetime1">
               <a:rPr lang="en-US" smtClean="0"/>
-              <a:t>8/6/2022</a:t>
+              <a:t>10/21/2022</a:t>
             </a:fld>
             <a:endParaRPr lang="en-US" dirty="0"/>
           </a:p>
@@ -8977,7 +9324,7 @@
           <a:p>
             <a:fld id="{3F9A13D6-B8C2-463B-B3F7-C62E098B328E}" type="datetime1">
               <a:rPr lang="en-US" smtClean="0"/>
-              <a:t>8/6/2022</a:t>
+              <a:t>10/21/2022</a:t>
             </a:fld>
             <a:endParaRPr lang="en-US" dirty="0"/>
           </a:p>
@@ -9212,7 +9559,7 @@
           <a:p>
             <a:fld id="{D2B63420-31EE-4E4B-911C-2601B14D9FDD}" type="datetime1">
               <a:rPr lang="en-US" smtClean="0"/>
-              <a:t>8/6/2022</a:t>
+              <a:t>10/21/2022</a:t>
             </a:fld>
             <a:endParaRPr lang="en-US" dirty="0"/>
           </a:p>
@@ -9589,7 +9936,7 @@
           <a:p>
             <a:fld id="{2DD8986D-86F8-41E6-8CFF-8C91AEF92622}" type="datetime1">
               <a:rPr lang="en-US" smtClean="0"/>
-              <a:t>8/6/2022</a:t>
+              <a:t>10/21/2022</a:t>
             </a:fld>
             <a:endParaRPr lang="en-US" dirty="0"/>
           </a:p>
@@ -9715,7 +10062,7 @@
           <a:p>
             <a:fld id="{BA885161-032E-4C6A-8EDA-39D168DF18E4}" type="datetime1">
               <a:rPr lang="en-US" smtClean="0"/>
-              <a:t>8/6/2022</a:t>
+              <a:t>10/21/2022</a:t>
             </a:fld>
             <a:endParaRPr lang="en-US" dirty="0"/>
           </a:p>
@@ -9813,7 +10160,7 @@
           <a:p>
             <a:fld id="{958E6740-E523-48D9-9C4E-6F218E87BAF3}" type="datetime1">
               <a:rPr lang="en-US" smtClean="0"/>
-              <a:t>8/6/2022</a:t>
+              <a:t>10/21/2022</a:t>
             </a:fld>
             <a:endParaRPr lang="en-US" dirty="0"/>
           </a:p>
@@ -10071,7 +10418,7 @@
           <a:p>
             <a:fld id="{6121D4CA-FF09-4CB8-8D51-2613D19A0F2E}" type="datetime1">
               <a:rPr lang="en-US" smtClean="0"/>
-              <a:t>8/6/2022</a:t>
+              <a:t>10/21/2022</a:t>
             </a:fld>
             <a:endParaRPr lang="en-US" dirty="0"/>
           </a:p>
@@ -10336,7 +10683,7 @@
           <a:p>
             <a:fld id="{8C4779EA-AEA7-43B3-9B65-A77E9A890421}" type="datetime1">
               <a:rPr lang="en-US" smtClean="0"/>
-              <a:t>8/6/2022</a:t>
+              <a:t>10/21/2022</a:t>
             </a:fld>
             <a:endParaRPr lang="en-US" dirty="0"/>
           </a:p>
@@ -11082,7 +11429,7 @@
           <a:p>
             <a:fld id="{059A67F1-3EA0-4026-BE6A-31EE4E1B1DB5}" type="datetime1">
               <a:rPr lang="en-US" smtClean="0"/>
-              <a:t>8/6/2022</a:t>
+              <a:t>10/21/2022</a:t>
             </a:fld>
             <a:endParaRPr lang="en-US" dirty="0"/>
           </a:p>
@@ -11806,7 +12153,7 @@
                 <a:tabLst/>
                 <a:defRPr/>
               </a:pPr>
-              <a:t>8/6/2022</a:t>
+              <a:t>10/21/2022</a:t>
             </a:fld>
             <a:endParaRPr kumimoji="0" lang="en-US" sz="900" b="0" i="0" u="none" strike="noStrike" kern="1200" cap="none" spc="0" normalizeH="0" baseline="0" noProof="0" dirty="0">
               <a:ln>
@@ -11990,7 +12337,7 @@
 </file>
 
 <file path=ppt/slides/slide10.xml><?xml version="1.0" encoding="utf-8"?>
-<p:sld xmlns:a="http://schemas.openxmlformats.org/drawingml/2006/main" xmlns:r="http://schemas.openxmlformats.org/officeDocument/2006/relationships" xmlns:p="http://schemas.openxmlformats.org/presentationml/2006/main" showMasterSp="0">
+<p:sld xmlns:a="http://schemas.openxmlformats.org/drawingml/2006/main" xmlns:r="http://schemas.openxmlformats.org/officeDocument/2006/relationships" xmlns:p="http://schemas.openxmlformats.org/presentationml/2006/main">
   <p:cSld>
     <p:spTree>
       <p:nvGrpSpPr>
@@ -12024,21 +12371,20 @@
         </p:nvSpPr>
         <p:spPr/>
         <p:txBody>
-          <a:bodyPr>
-            <a:normAutofit/>
-          </a:bodyPr>
-          <a:lstStyle/>
-          <a:p>
+          <a:bodyPr/>
+          <a:lstStyle/>
+          <a:p>
+            <a:pPr algn="ctr"/>
             <a:r>
               <a:rPr lang="en-US" dirty="0"/>
-              <a:t>Debugging</a:t>
+              <a:t>Graphics – Example</a:t>
             </a:r>
             <a:br>
               <a:rPr lang="en-US" dirty="0"/>
             </a:br>
             <a:r>
               <a:rPr lang="en-US" dirty="0"/>
-              <a:t> – Dealing with program problems</a:t>
+              <a:t>Simple Notes data base</a:t>
             </a:r>
           </a:p>
         </p:txBody>
@@ -12061,8 +12407,8 @@
         </p:nvSpPr>
         <p:spPr>
           <a:xfrm>
-            <a:off x="677333" y="2160589"/>
-            <a:ext cx="9815965" cy="3880773"/>
+            <a:off x="677334" y="1930400"/>
+            <a:ext cx="8596668" cy="4110962"/>
           </a:xfrm>
         </p:spPr>
         <p:txBody>
@@ -12071,35 +12417,94 @@
           </a:bodyPr>
           <a:lstStyle/>
           <a:p>
-            <a:r>
-              <a:rPr lang="en-US" sz="4000" dirty="0"/>
-              <a:t>print statements in the program</a:t>
-            </a:r>
-          </a:p>
-          <a:p>
-            <a:r>
-              <a:rPr lang="en-US" sz="4000" dirty="0"/>
-              <a:t>"too noisy"- include "if </a:t>
-            </a:r>
-            <a:r>
-              <a:rPr lang="en-US" sz="4000" i="1" dirty="0"/>
-              <a:t>trace_flag:"</a:t>
-            </a:r>
-          </a:p>
-          <a:p>
-            <a:r>
-              <a:rPr lang="en-US" sz="4000" i="1" dirty="0"/>
-              <a:t>Break up complex operations</a:t>
-            </a:r>
-          </a:p>
-          <a:p>
-            <a:r>
-              <a:rPr lang="en-US" sz="4000" i="1" dirty="0"/>
-              <a:t>Use descriptive variables</a:t>
-            </a:r>
-          </a:p>
-          <a:p>
-            <a:endParaRPr lang="en-US" sz="3600" dirty="0"/>
+            <a:pPr marL="0" indent="0">
+              <a:buNone/>
+            </a:pPr>
+            <a:r>
+              <a:rPr lang="en-US" sz="3600" dirty="0">
+                <a:solidFill>
+                  <a:schemeClr val="accent1"/>
+                </a:solidFill>
+              </a:rPr>
+              <a:t>Display file lines containing pattern</a:t>
+            </a:r>
+          </a:p>
+          <a:p>
+            <a:pPr lvl="1"/>
+            <a:r>
+              <a:rPr lang="en-US" sz="3400" dirty="0">
+                <a:solidFill>
+                  <a:schemeClr val="accent1"/>
+                </a:solidFill>
+              </a:rPr>
+              <a:t>Terminal based </a:t>
+            </a:r>
+          </a:p>
+          <a:p>
+            <a:pPr marL="914400" lvl="2" indent="0">
+              <a:buNone/>
+            </a:pPr>
+            <a:r>
+              <a:rPr lang="en-US" sz="3200" dirty="0">
+                <a:solidFill>
+                  <a:srgbClr val="00B0F0"/>
+                </a:solidFill>
+              </a:rPr>
+              <a:t>exercises/notes/notes_3e.py</a:t>
+            </a:r>
+          </a:p>
+          <a:p>
+            <a:pPr lvl="1"/>
+            <a:r>
+              <a:rPr lang="en-US" sz="3400" dirty="0">
+                <a:solidFill>
+                  <a:schemeClr val="accent1"/>
+                </a:solidFill>
+              </a:rPr>
+              <a:t>Graphics version</a:t>
+            </a:r>
+          </a:p>
+          <a:p>
+            <a:pPr marL="457200" lvl="1" indent="0">
+              <a:buNone/>
+            </a:pPr>
+            <a:r>
+              <a:rPr lang="en-US" sz="3600" dirty="0">
+                <a:solidFill>
+                  <a:srgbClr val="00B0F0"/>
+                </a:solidFill>
+              </a:rPr>
+              <a:t>	</a:t>
+            </a:r>
+            <a:r>
+              <a:rPr lang="en-US" sz="3200" dirty="0">
+                <a:solidFill>
+                  <a:srgbClr val="00B0F0"/>
+                </a:solidFill>
+              </a:rPr>
+              <a:t>exercises/graphics/notes_graphics.py</a:t>
+            </a:r>
+          </a:p>
+          <a:p>
+            <a:pPr marL="457200" lvl="1" indent="0">
+              <a:buNone/>
+            </a:pPr>
+            <a:r>
+              <a:rPr lang="en-US" sz="3200" dirty="0">
+                <a:solidFill>
+                  <a:srgbClr val="00B0F0"/>
+                </a:solidFill>
+              </a:rPr>
+              <a:t>	exercises/graphics/notes_data_win.py</a:t>
+            </a:r>
+          </a:p>
+          <a:p>
+            <a:pPr lvl="1"/>
+            <a:endParaRPr lang="en-US" sz="3400" dirty="0">
+              <a:solidFill>
+                <a:schemeClr val="accent1"/>
+              </a:solidFill>
+            </a:endParaRPr>
           </a:p>
         </p:txBody>
       </p:sp>
@@ -12175,7 +12580,7 @@
                 <a:tabLst/>
                 <a:defRPr/>
               </a:pPr>
-              <a:t>8/6/2022</a:t>
+              <a:t>10/21/2022</a:t>
             </a:fld>
             <a:endParaRPr kumimoji="0" lang="en-US" sz="900" b="0" i="0" u="none" strike="noStrike" kern="1200" cap="none" spc="0" normalizeH="0" baseline="0" noProof="0" dirty="0">
               <a:ln>
@@ -12348,7 +12753,7 @@
     </p:spTree>
     <p:extLst>
       <p:ext uri="{BB962C8B-B14F-4D97-AF65-F5344CB8AC3E}">
-        <p14:creationId xmlns:p14="http://schemas.microsoft.com/office/powerpoint/2010/main" val="1875583522"/>
+        <p14:creationId xmlns:p14="http://schemas.microsoft.com/office/powerpoint/2010/main" val="2756692610"/>
       </p:ext>
     </p:extLst>
   </p:cSld>
@@ -12407,7 +12812,7 @@
             </a:br>
             <a:r>
               <a:rPr lang="en-US" dirty="0"/>
-              <a:t> – IDLE Debugger</a:t>
+              <a:t> – Dealing with program problems</a:t>
             </a:r>
           </a:p>
         </p:txBody>
@@ -12441,26 +12846,34 @@
           <a:lstStyle/>
           <a:p>
             <a:r>
-              <a:rPr lang="en-US" sz="3600" dirty="0"/>
-              <a:t>Open program file to be debugged</a:t>
-            </a:r>
-          </a:p>
-          <a:p>
-            <a:r>
-              <a:rPr lang="en-US" sz="3600" dirty="0"/>
-              <a:t>Run </a:t>
-            </a:r>
-            <a:r>
-              <a:rPr lang="en-US" sz="3600" dirty="0">
-                <a:sym typeface="Wingdings" panose="05000000000000000000" pitchFamily="2" charset="2"/>
-              </a:rPr>
-              <a:t>Python Shell</a:t>
-            </a:r>
-          </a:p>
-          <a:p>
-            <a:endParaRPr lang="en-US" sz="3600" dirty="0">
-              <a:sym typeface="Wingdings" panose="05000000000000000000" pitchFamily="2" charset="2"/>
-            </a:endParaRPr>
+              <a:rPr lang="en-US" sz="4000" dirty="0"/>
+              <a:t>print statements in the program</a:t>
+            </a:r>
+          </a:p>
+          <a:p>
+            <a:r>
+              <a:rPr lang="en-US" sz="4000" dirty="0"/>
+              <a:t>"too noisy"- include "if </a:t>
+            </a:r>
+            <a:r>
+              <a:rPr lang="en-US" sz="4000" i="1" dirty="0"/>
+              <a:t>trace_flag:"</a:t>
+            </a:r>
+          </a:p>
+          <a:p>
+            <a:r>
+              <a:rPr lang="en-US" sz="4000" i="1" dirty="0"/>
+              <a:t>Break up complex operations</a:t>
+            </a:r>
+          </a:p>
+          <a:p>
+            <a:r>
+              <a:rPr lang="en-US" sz="4000" i="1" dirty="0"/>
+              <a:t>Use descriptive variables</a:t>
+            </a:r>
+          </a:p>
+          <a:p>
+            <a:endParaRPr lang="en-US" sz="3600" dirty="0"/>
           </a:p>
         </p:txBody>
       </p:sp>
@@ -12536,7 +12949,7 @@
                 <a:tabLst/>
                 <a:defRPr/>
               </a:pPr>
-              <a:t>8/6/2022</a:t>
+              <a:t>10/21/2022</a:t>
             </a:fld>
             <a:endParaRPr kumimoji="0" lang="en-US" sz="900" b="0" i="0" u="none" strike="noStrike" kern="1200" cap="none" spc="0" normalizeH="0" baseline="0" noProof="0" dirty="0">
               <a:ln>
@@ -12688,6 +13101,367 @@
                 <a:defRPr/>
               </a:pPr>
               <a:t>11</a:t>
+            </a:fld>
+            <a:endParaRPr kumimoji="0" lang="en-US" sz="900" b="0" i="0" u="none" strike="noStrike" kern="1200" cap="none" spc="0" normalizeH="0" baseline="0" noProof="0" dirty="0">
+              <a:ln>
+                <a:noFill/>
+              </a:ln>
+              <a:solidFill>
+                <a:srgbClr val="90C226"/>
+              </a:solidFill>
+              <a:effectLst/>
+              <a:uLnTx/>
+              <a:uFillTx/>
+              <a:latin typeface="Trebuchet MS" panose="020B0603020202020204"/>
+              <a:ea typeface="+mn-ea"/>
+              <a:cs typeface="+mn-cs"/>
+            </a:endParaRPr>
+          </a:p>
+        </p:txBody>
+      </p:sp>
+    </p:spTree>
+    <p:extLst>
+      <p:ext uri="{BB962C8B-B14F-4D97-AF65-F5344CB8AC3E}">
+        <p14:creationId xmlns:p14="http://schemas.microsoft.com/office/powerpoint/2010/main" val="1875583522"/>
+      </p:ext>
+    </p:extLst>
+  </p:cSld>
+  <p:clrMapOvr>
+    <a:masterClrMapping/>
+  </p:clrMapOvr>
+</p:sld>
+</file>
+
+<file path=ppt/slides/slide12.xml><?xml version="1.0" encoding="utf-8"?>
+<p:sld xmlns:a="http://schemas.openxmlformats.org/drawingml/2006/main" xmlns:r="http://schemas.openxmlformats.org/officeDocument/2006/relationships" xmlns:p="http://schemas.openxmlformats.org/presentationml/2006/main" showMasterSp="0">
+  <p:cSld>
+    <p:spTree>
+      <p:nvGrpSpPr>
+        <p:cNvPr id="1" name=""/>
+        <p:cNvGrpSpPr/>
+        <p:nvPr/>
+      </p:nvGrpSpPr>
+      <p:grpSpPr>
+        <a:xfrm>
+          <a:off x="0" y="0"/>
+          <a:ext cx="0" cy="0"/>
+          <a:chOff x="0" y="0"/>
+          <a:chExt cx="0" cy="0"/>
+        </a:xfrm>
+      </p:grpSpPr>
+      <p:sp>
+        <p:nvSpPr>
+          <p:cNvPr id="2" name="Title 1">
+            <a:extLst>
+              <a:ext uri="{FF2B5EF4-FFF2-40B4-BE49-F238E27FC236}">
+                <a16:creationId xmlns:a16="http://schemas.microsoft.com/office/drawing/2014/main" id="{00C99C45-A655-40FD-BF53-F03EF1F5E416}"/>
+              </a:ext>
+            </a:extLst>
+          </p:cNvPr>
+          <p:cNvSpPr>
+            <a:spLocks noGrp="1"/>
+          </p:cNvSpPr>
+          <p:nvPr>
+            <p:ph type="title"/>
+          </p:nvPr>
+        </p:nvSpPr>
+        <p:spPr/>
+        <p:txBody>
+          <a:bodyPr>
+            <a:normAutofit/>
+          </a:bodyPr>
+          <a:lstStyle/>
+          <a:p>
+            <a:r>
+              <a:rPr lang="en-US" dirty="0"/>
+              <a:t>Debugging</a:t>
+            </a:r>
+            <a:br>
+              <a:rPr lang="en-US" dirty="0"/>
+            </a:br>
+            <a:r>
+              <a:rPr lang="en-US" dirty="0"/>
+              <a:t> – IDLE Debugger</a:t>
+            </a:r>
+          </a:p>
+        </p:txBody>
+      </p:sp>
+      <p:sp>
+        <p:nvSpPr>
+          <p:cNvPr id="3" name="Content Placeholder 2">
+            <a:extLst>
+              <a:ext uri="{FF2B5EF4-FFF2-40B4-BE49-F238E27FC236}">
+                <a16:creationId xmlns:a16="http://schemas.microsoft.com/office/drawing/2014/main" id="{AAE989A4-422F-4666-8E03-249076443C19}"/>
+              </a:ext>
+            </a:extLst>
+          </p:cNvPr>
+          <p:cNvSpPr>
+            <a:spLocks noGrp="1"/>
+          </p:cNvSpPr>
+          <p:nvPr>
+            <p:ph idx="1"/>
+          </p:nvPr>
+        </p:nvSpPr>
+        <p:spPr>
+          <a:xfrm>
+            <a:off x="677333" y="2160589"/>
+            <a:ext cx="9815965" cy="3880773"/>
+          </a:xfrm>
+        </p:spPr>
+        <p:txBody>
+          <a:bodyPr>
+            <a:normAutofit/>
+          </a:bodyPr>
+          <a:lstStyle/>
+          <a:p>
+            <a:r>
+              <a:rPr lang="en-US" sz="3600" dirty="0"/>
+              <a:t>Open program file to be debugged</a:t>
+            </a:r>
+          </a:p>
+          <a:p>
+            <a:r>
+              <a:rPr lang="en-US" sz="3600" dirty="0"/>
+              <a:t>Run </a:t>
+            </a:r>
+            <a:r>
+              <a:rPr lang="en-US" sz="3600" dirty="0">
+                <a:sym typeface="Wingdings" panose="05000000000000000000" pitchFamily="2" charset="2"/>
+              </a:rPr>
+              <a:t>Python Shell</a:t>
+            </a:r>
+          </a:p>
+          <a:p>
+            <a:endParaRPr lang="en-US" sz="3600" dirty="0">
+              <a:sym typeface="Wingdings" panose="05000000000000000000" pitchFamily="2" charset="2"/>
+            </a:endParaRPr>
+          </a:p>
+        </p:txBody>
+      </p:sp>
+      <p:sp>
+        <p:nvSpPr>
+          <p:cNvPr id="4" name="Date Placeholder 3">
+            <a:extLst>
+              <a:ext uri="{FF2B5EF4-FFF2-40B4-BE49-F238E27FC236}">
+                <a16:creationId xmlns:a16="http://schemas.microsoft.com/office/drawing/2014/main" id="{D4B58B9C-2101-47C6-B21D-A9C4C0222113}"/>
+              </a:ext>
+            </a:extLst>
+          </p:cNvPr>
+          <p:cNvSpPr>
+            <a:spLocks noGrp="1"/>
+          </p:cNvSpPr>
+          <p:nvPr>
+            <p:ph type="dt" sz="half" idx="10"/>
+          </p:nvPr>
+        </p:nvSpPr>
+        <p:spPr/>
+        <p:txBody>
+          <a:bodyPr/>
+          <a:lstStyle/>
+          <a:p>
+            <a:pPr marL="0" marR="0" lvl="0" indent="0" algn="r" defTabSz="457200" rtl="0" eaLnBrk="1" fontAlgn="auto" latinLnBrk="0" hangingPunct="1">
+              <a:lnSpc>
+                <a:spcPct val="100000"/>
+              </a:lnSpc>
+              <a:spcBef>
+                <a:spcPts val="0"/>
+              </a:spcBef>
+              <a:spcAft>
+                <a:spcPts val="0"/>
+              </a:spcAft>
+              <a:buClrTx/>
+              <a:buSzTx/>
+              <a:buFontTx/>
+              <a:buNone/>
+              <a:tabLst/>
+              <a:defRPr/>
+            </a:pPr>
+            <a:fld id="{A7119916-CD40-456D-ABE3-55F8822671F7}" type="datetime1">
+              <a:rPr kumimoji="0" lang="en-US" sz="900" b="0" i="0" u="none" strike="noStrike" kern="1200" cap="none" spc="0" normalizeH="0" baseline="0" noProof="0" smtClean="0">
+                <a:ln>
+                  <a:noFill/>
+                </a:ln>
+                <a:solidFill>
+                  <a:prstClr val="black">
+                    <a:tint val="75000"/>
+                  </a:prstClr>
+                </a:solidFill>
+                <a:effectLst/>
+                <a:uLnTx/>
+                <a:uFillTx/>
+                <a:latin typeface="Trebuchet MS" panose="020B0603020202020204"/>
+                <a:ea typeface="+mn-ea"/>
+                <a:cs typeface="+mn-cs"/>
+              </a:rPr>
+              <a:pPr marL="0" marR="0" lvl="0" indent="0" algn="r" defTabSz="457200" rtl="0" eaLnBrk="1" fontAlgn="auto" latinLnBrk="0" hangingPunct="1">
+                <a:lnSpc>
+                  <a:spcPct val="100000"/>
+                </a:lnSpc>
+                <a:spcBef>
+                  <a:spcPts val="0"/>
+                </a:spcBef>
+                <a:spcAft>
+                  <a:spcPts val="0"/>
+                </a:spcAft>
+                <a:buClrTx/>
+                <a:buSzTx/>
+                <a:buFontTx/>
+                <a:buNone/>
+                <a:tabLst/>
+                <a:defRPr/>
+              </a:pPr>
+              <a:t>10/21/2022</a:t>
+            </a:fld>
+            <a:endParaRPr kumimoji="0" lang="en-US" sz="900" b="0" i="0" u="none" strike="noStrike" kern="1200" cap="none" spc="0" normalizeH="0" baseline="0" noProof="0" dirty="0">
+              <a:ln>
+                <a:noFill/>
+              </a:ln>
+              <a:solidFill>
+                <a:prstClr val="black">
+                  <a:tint val="75000"/>
+                </a:prstClr>
+              </a:solidFill>
+              <a:effectLst/>
+              <a:uLnTx/>
+              <a:uFillTx/>
+              <a:latin typeface="Trebuchet MS" panose="020B0603020202020204"/>
+              <a:ea typeface="+mn-ea"/>
+              <a:cs typeface="+mn-cs"/>
+            </a:endParaRPr>
+          </a:p>
+        </p:txBody>
+      </p:sp>
+      <p:sp>
+        <p:nvSpPr>
+          <p:cNvPr id="5" name="Footer Placeholder 4">
+            <a:extLst>
+              <a:ext uri="{FF2B5EF4-FFF2-40B4-BE49-F238E27FC236}">
+                <a16:creationId xmlns:a16="http://schemas.microsoft.com/office/drawing/2014/main" id="{EB3CE92E-DA4C-49CE-8437-22304F783D2B}"/>
+              </a:ext>
+            </a:extLst>
+          </p:cNvPr>
+          <p:cNvSpPr>
+            <a:spLocks noGrp="1"/>
+          </p:cNvSpPr>
+          <p:nvPr>
+            <p:ph type="ftr" sz="quarter" idx="11"/>
+          </p:nvPr>
+        </p:nvSpPr>
+        <p:spPr/>
+        <p:txBody>
+          <a:bodyPr/>
+          <a:lstStyle/>
+          <a:p>
+            <a:pPr marL="0" marR="0" lvl="0" indent="0" algn="l" defTabSz="457200" rtl="0" eaLnBrk="1" fontAlgn="auto" latinLnBrk="0" hangingPunct="1">
+              <a:lnSpc>
+                <a:spcPct val="100000"/>
+              </a:lnSpc>
+              <a:spcBef>
+                <a:spcPts val="0"/>
+              </a:spcBef>
+              <a:spcAft>
+                <a:spcPts val="0"/>
+              </a:spcAft>
+              <a:buClrTx/>
+              <a:buSzTx/>
+              <a:buFontTx/>
+              <a:buNone/>
+              <a:tabLst/>
+              <a:defRPr/>
+            </a:pPr>
+            <a:r>
+              <a:rPr kumimoji="0" lang="en-US" sz="900" b="0" i="0" u="none" strike="noStrike" kern="1200" cap="none" spc="0" normalizeH="0" baseline="0" noProof="0" dirty="0">
+                <a:ln>
+                  <a:noFill/>
+                </a:ln>
+                <a:solidFill>
+                  <a:prstClr val="black">
+                    <a:tint val="75000"/>
+                  </a:prstClr>
+                </a:solidFill>
+                <a:effectLst/>
+                <a:uLnTx/>
+                <a:uFillTx/>
+                <a:latin typeface="Trebuchet MS" panose="020B0603020202020204"/>
+                <a:ea typeface="+mn-ea"/>
+                <a:cs typeface="+mn-cs"/>
+              </a:rPr>
+              <a:t>raysmith@alum.mit.edu</a:t>
+            </a:r>
+          </a:p>
+        </p:txBody>
+      </p:sp>
+      <p:sp>
+        <p:nvSpPr>
+          <p:cNvPr id="6" name="Slide Number Placeholder 5">
+            <a:extLst>
+              <a:ext uri="{FF2B5EF4-FFF2-40B4-BE49-F238E27FC236}">
+                <a16:creationId xmlns:a16="http://schemas.microsoft.com/office/drawing/2014/main" id="{B555E688-FCD7-4E06-BD33-DA64AB1C3FA4}"/>
+              </a:ext>
+            </a:extLst>
+          </p:cNvPr>
+          <p:cNvSpPr>
+            <a:spLocks noGrp="1"/>
+          </p:cNvSpPr>
+          <p:nvPr>
+            <p:ph type="sldNum" sz="quarter" idx="12"/>
+          </p:nvPr>
+        </p:nvSpPr>
+        <p:spPr/>
+        <p:txBody>
+          <a:bodyPr/>
+          <a:lstStyle/>
+          <a:p>
+            <a:pPr marL="0" marR="0" lvl="0" indent="0" algn="r" defTabSz="457200" rtl="0" eaLnBrk="1" fontAlgn="auto" latinLnBrk="0" hangingPunct="1">
+              <a:lnSpc>
+                <a:spcPct val="100000"/>
+              </a:lnSpc>
+              <a:spcBef>
+                <a:spcPts val="0"/>
+              </a:spcBef>
+              <a:spcAft>
+                <a:spcPts val="0"/>
+              </a:spcAft>
+              <a:buClrTx/>
+              <a:buSzTx/>
+              <a:buFontTx/>
+              <a:buNone/>
+              <a:tabLst/>
+              <a:defRPr/>
+            </a:pPr>
+            <a:fld id="{6D22F896-40B5-4ADD-8801-0D06FADFA095}" type="slidenum">
+              <a:rPr kumimoji="0" lang="en-US" sz="900" b="0" i="0" u="none" strike="noStrike" kern="1200" cap="none" spc="0" normalizeH="0" baseline="0" noProof="0" smtClean="0">
+                <a:ln>
+                  <a:noFill/>
+                </a:ln>
+                <a:solidFill>
+                  <a:srgbClr val="90C226"/>
+                </a:solidFill>
+                <a:effectLst/>
+                <a:uLnTx/>
+                <a:uFillTx/>
+                <a:latin typeface="Trebuchet MS" panose="020B0603020202020204"/>
+                <a:ea typeface="+mn-ea"/>
+                <a:cs typeface="+mn-cs"/>
+              </a:rPr>
+              <a:pPr marL="0" marR="0" lvl="0" indent="0" algn="r" defTabSz="457200" rtl="0" eaLnBrk="1" fontAlgn="auto" latinLnBrk="0" hangingPunct="1">
+                <a:lnSpc>
+                  <a:spcPct val="100000"/>
+                </a:lnSpc>
+                <a:spcBef>
+                  <a:spcPts val="0"/>
+                </a:spcBef>
+                <a:spcAft>
+                  <a:spcPts val="0"/>
+                </a:spcAft>
+                <a:buClrTx/>
+                <a:buSzTx/>
+                <a:buFontTx/>
+                <a:buNone/>
+                <a:tabLst/>
+                <a:defRPr/>
+              </a:pPr>
+              <a:t>12</a:t>
             </a:fld>
             <a:endParaRPr kumimoji="0" lang="en-US" sz="900" b="0" i="0" u="none" strike="noStrike" kern="1200" cap="none" spc="0" normalizeH="0" baseline="0" noProof="0" dirty="0">
               <a:ln>
@@ -12749,7 +13523,7 @@
 </p:sld>
 </file>
 
-<file path=ppt/slides/slide12.xml><?xml version="1.0" encoding="utf-8"?>
+<file path=ppt/slides/slide13.xml><?xml version="1.0" encoding="utf-8"?>
 <p:sld xmlns:a="http://schemas.openxmlformats.org/drawingml/2006/main" xmlns:r="http://schemas.openxmlformats.org/officeDocument/2006/relationships" xmlns:p="http://schemas.openxmlformats.org/presentationml/2006/main" showMasterSp="0">
   <p:cSld>
     <p:spTree>
@@ -12927,7 +13701,7 @@
                 <a:tabLst/>
                 <a:defRPr/>
               </a:pPr>
-              <a:t>8/6/2022</a:t>
+              <a:t>10/21/2022</a:t>
             </a:fld>
             <a:endParaRPr kumimoji="0" lang="en-US" sz="900" b="0" i="0" u="none" strike="noStrike" kern="1200" cap="none" spc="0" normalizeH="0" baseline="0" noProof="0" dirty="0">
               <a:ln>
@@ -13078,7 +13852,7 @@
                 <a:tabLst/>
                 <a:defRPr/>
               </a:pPr>
-              <a:t>12</a:t>
+              <a:t>13</a:t>
             </a:fld>
             <a:endParaRPr kumimoji="0" lang="en-US" sz="900" b="0" i="0" u="none" strike="noStrike" kern="1200" cap="none" spc="0" normalizeH="0" baseline="0" noProof="0" dirty="0">
               <a:ln>
@@ -13140,7 +13914,7 @@
 </p:sld>
 </file>
 
-<file path=ppt/slides/slide13.xml><?xml version="1.0" encoding="utf-8"?>
+<file path=ppt/slides/slide14.xml><?xml version="1.0" encoding="utf-8"?>
 <p:sld xmlns:a="http://schemas.openxmlformats.org/drawingml/2006/main" xmlns:r="http://schemas.openxmlformats.org/officeDocument/2006/relationships" xmlns:p="http://schemas.openxmlformats.org/presentationml/2006/main" showMasterSp="0">
   <p:cSld>
     <p:spTree>
@@ -13295,7 +14069,7 @@
                 <a:tabLst/>
                 <a:defRPr/>
               </a:pPr>
-              <a:t>8/6/2022</a:t>
+              <a:t>10/21/2022</a:t>
             </a:fld>
             <a:endParaRPr kumimoji="0" lang="en-US" sz="900" b="0" i="0" u="none" strike="noStrike" kern="1200" cap="none" spc="0" normalizeH="0" baseline="0" noProof="0" dirty="0">
               <a:ln>
@@ -13446,7 +14220,7 @@
                 <a:tabLst/>
                 <a:defRPr/>
               </a:pPr>
-              <a:t>13</a:t>
+              <a:t>14</a:t>
             </a:fld>
             <a:endParaRPr kumimoji="0" lang="en-US" sz="900" b="0" i="0" u="none" strike="noStrike" kern="1200" cap="none" spc="0" normalizeH="0" baseline="0" noProof="0" dirty="0">
               <a:ln>
@@ -13478,7 +14252,7 @@
 </p:sld>
 </file>
 
-<file path=ppt/slides/slide14.xml><?xml version="1.0" encoding="utf-8"?>
+<file path=ppt/slides/slide15.xml><?xml version="1.0" encoding="utf-8"?>
 <p:sld xmlns:a="http://schemas.openxmlformats.org/drawingml/2006/main" xmlns:r="http://schemas.openxmlformats.org/officeDocument/2006/relationships" xmlns:p="http://schemas.openxmlformats.org/presentationml/2006/main" showMasterSp="0">
   <p:cSld>
     <p:spTree>
@@ -13674,198 +14448,6 @@
 </p:sld>
 </file>
 
-<file path=ppt/slides/slide15.xml><?xml version="1.0" encoding="utf-8"?>
-<p:sld xmlns:a="http://schemas.openxmlformats.org/drawingml/2006/main" xmlns:r="http://schemas.openxmlformats.org/officeDocument/2006/relationships" xmlns:p="http://schemas.openxmlformats.org/presentationml/2006/main" showMasterSp="0">
-  <p:cSld>
-    <p:spTree>
-      <p:nvGrpSpPr>
-        <p:cNvPr id="1" name=""/>
-        <p:cNvGrpSpPr/>
-        <p:nvPr/>
-      </p:nvGrpSpPr>
-      <p:grpSpPr>
-        <a:xfrm>
-          <a:off x="0" y="0"/>
-          <a:ext cx="0" cy="0"/>
-          <a:chOff x="0" y="0"/>
-          <a:chExt cx="0" cy="0"/>
-        </a:xfrm>
-      </p:grpSpPr>
-      <p:sp>
-        <p:nvSpPr>
-          <p:cNvPr id="2" name="Title 1">
-            <a:extLst>
-              <a:ext uri="{FF2B5EF4-FFF2-40B4-BE49-F238E27FC236}">
-                <a16:creationId xmlns:a16="http://schemas.microsoft.com/office/drawing/2014/main" id="{00C99C45-A655-40FD-BF53-F03EF1F5E416}"/>
-              </a:ext>
-            </a:extLst>
-          </p:cNvPr>
-          <p:cNvSpPr>
-            <a:spLocks noGrp="1"/>
-          </p:cNvSpPr>
-          <p:nvPr>
-            <p:ph type="title"/>
-          </p:nvPr>
-        </p:nvSpPr>
-        <p:spPr/>
-        <p:txBody>
-          <a:bodyPr>
-            <a:normAutofit/>
-          </a:bodyPr>
-          <a:lstStyle/>
-          <a:p>
-            <a:r>
-              <a:rPr lang="en-US" dirty="0"/>
-              <a:t>Debug Control</a:t>
-            </a:r>
-            <a:br>
-              <a:rPr lang="en-US" dirty="0"/>
-            </a:br>
-            <a:r>
-              <a:rPr lang="en-US" dirty="0"/>
-              <a:t> Operation</a:t>
-            </a:r>
-          </a:p>
-        </p:txBody>
-      </p:sp>
-      <p:sp>
-        <p:nvSpPr>
-          <p:cNvPr id="5" name="Footer Placeholder 4">
-            <a:extLst>
-              <a:ext uri="{FF2B5EF4-FFF2-40B4-BE49-F238E27FC236}">
-                <a16:creationId xmlns:a16="http://schemas.microsoft.com/office/drawing/2014/main" id="{EB3CE92E-DA4C-49CE-8437-22304F783D2B}"/>
-              </a:ext>
-            </a:extLst>
-          </p:cNvPr>
-          <p:cNvSpPr>
-            <a:spLocks noGrp="1"/>
-          </p:cNvSpPr>
-          <p:nvPr>
-            <p:ph type="ftr" sz="quarter" idx="11"/>
-          </p:nvPr>
-        </p:nvSpPr>
-        <p:spPr/>
-        <p:txBody>
-          <a:bodyPr/>
-          <a:lstStyle/>
-          <a:p>
-            <a:pPr marL="0" marR="0" lvl="0" indent="0" algn="l" defTabSz="457200" rtl="0" eaLnBrk="1" fontAlgn="auto" latinLnBrk="0" hangingPunct="1">
-              <a:lnSpc>
-                <a:spcPct val="100000"/>
-              </a:lnSpc>
-              <a:spcBef>
-                <a:spcPts val="0"/>
-              </a:spcBef>
-              <a:spcAft>
-                <a:spcPts val="0"/>
-              </a:spcAft>
-              <a:buClrTx/>
-              <a:buSzTx/>
-              <a:buFontTx/>
-              <a:buNone/>
-              <a:tabLst/>
-              <a:defRPr/>
-            </a:pPr>
-            <a:r>
-              <a:rPr kumimoji="0" lang="en-US" sz="900" b="0" i="0" u="none" strike="noStrike" kern="1200" cap="none" spc="0" normalizeH="0" baseline="0" noProof="0" dirty="0">
-                <a:ln>
-                  <a:noFill/>
-                </a:ln>
-                <a:solidFill>
-                  <a:prstClr val="black">
-                    <a:tint val="75000"/>
-                  </a:prstClr>
-                </a:solidFill>
-                <a:effectLst/>
-                <a:uLnTx/>
-                <a:uFillTx/>
-                <a:latin typeface="Trebuchet MS" panose="020B0603020202020204"/>
-                <a:ea typeface="+mn-ea"/>
-                <a:cs typeface="+mn-cs"/>
-              </a:rPr>
-              <a:t>raysmith@alum.mit.edu</a:t>
-            </a:r>
-          </a:p>
-        </p:txBody>
-      </p:sp>
-      <p:sp>
-        <p:nvSpPr>
-          <p:cNvPr id="7" name="Content Placeholder 6">
-            <a:extLst>
-              <a:ext uri="{FF2B5EF4-FFF2-40B4-BE49-F238E27FC236}">
-                <a16:creationId xmlns:a16="http://schemas.microsoft.com/office/drawing/2014/main" id="{E5AD5BCF-A580-42A7-8820-4A0D1990F5E6}"/>
-              </a:ext>
-            </a:extLst>
-          </p:cNvPr>
-          <p:cNvSpPr>
-            <a:spLocks noGrp="1"/>
-          </p:cNvSpPr>
-          <p:nvPr>
-            <p:ph idx="1"/>
-          </p:nvPr>
-        </p:nvSpPr>
-        <p:spPr/>
-        <p:txBody>
-          <a:bodyPr>
-            <a:normAutofit lnSpcReduction="10000"/>
-          </a:bodyPr>
-          <a:lstStyle/>
-          <a:p>
-            <a:r>
-              <a:rPr lang="en-US" sz="3600" dirty="0"/>
-              <a:t>Go – start program</a:t>
-            </a:r>
-          </a:p>
-          <a:p>
-            <a:r>
-              <a:rPr lang="en-US" sz="3600" dirty="0">
-                <a:sym typeface="Wingdings" panose="05000000000000000000" pitchFamily="2" charset="2"/>
-              </a:rPr>
-              <a:t>Step – do one statement</a:t>
-            </a:r>
-          </a:p>
-          <a:p>
-            <a:r>
-              <a:rPr lang="en-US" sz="3600" dirty="0">
-                <a:sym typeface="Wingdings" panose="05000000000000000000" pitchFamily="2" charset="2"/>
-              </a:rPr>
-              <a:t>Over – do one statement over internal</a:t>
-            </a:r>
-          </a:p>
-          <a:p>
-            <a:r>
-              <a:rPr lang="en-US" sz="3600" dirty="0">
-                <a:sym typeface="Wingdings" panose="05000000000000000000" pitchFamily="2" charset="2"/>
-              </a:rPr>
-              <a:t>Out – execute till out of current routine</a:t>
-            </a:r>
-          </a:p>
-          <a:p>
-            <a:r>
-              <a:rPr lang="en-US" sz="3600" dirty="0">
-                <a:sym typeface="Wingdings" panose="05000000000000000000" pitchFamily="2" charset="2"/>
-              </a:rPr>
-              <a:t>Quit – quit program debugging </a:t>
-            </a:r>
-          </a:p>
-          <a:p>
-            <a:endParaRPr lang="en-US" sz="3600" dirty="0"/>
-          </a:p>
-        </p:txBody>
-      </p:sp>
-    </p:spTree>
-    <p:extLst>
-      <p:ext uri="{BB962C8B-B14F-4D97-AF65-F5344CB8AC3E}">
-        <p14:creationId xmlns:p14="http://schemas.microsoft.com/office/powerpoint/2010/main" val="53362547"/>
-      </p:ext>
-    </p:extLst>
-  </p:cSld>
-  <p:clrMapOvr>
-    <a:masterClrMapping/>
-  </p:clrMapOvr>
-</p:sld>
-</file>
-
 <file path=ppt/slides/slide16.xml><?xml version="1.0" encoding="utf-8"?>
 <p:sld xmlns:a="http://schemas.openxmlformats.org/drawingml/2006/main" xmlns:r="http://schemas.openxmlformats.org/officeDocument/2006/relationships" xmlns:p="http://schemas.openxmlformats.org/presentationml/2006/main" showMasterSp="0">
   <p:cSld>
@@ -13999,6 +14581,198 @@
         <p:spPr/>
         <p:txBody>
           <a:bodyPr>
+            <a:normAutofit lnSpcReduction="10000"/>
+          </a:bodyPr>
+          <a:lstStyle/>
+          <a:p>
+            <a:r>
+              <a:rPr lang="en-US" sz="3600" dirty="0"/>
+              <a:t>Go – start program</a:t>
+            </a:r>
+          </a:p>
+          <a:p>
+            <a:r>
+              <a:rPr lang="en-US" sz="3600" dirty="0">
+                <a:sym typeface="Wingdings" panose="05000000000000000000" pitchFamily="2" charset="2"/>
+              </a:rPr>
+              <a:t>Step – do one statement</a:t>
+            </a:r>
+          </a:p>
+          <a:p>
+            <a:r>
+              <a:rPr lang="en-US" sz="3600" dirty="0">
+                <a:sym typeface="Wingdings" panose="05000000000000000000" pitchFamily="2" charset="2"/>
+              </a:rPr>
+              <a:t>Over – do one statement over internal</a:t>
+            </a:r>
+          </a:p>
+          <a:p>
+            <a:r>
+              <a:rPr lang="en-US" sz="3600" dirty="0">
+                <a:sym typeface="Wingdings" panose="05000000000000000000" pitchFamily="2" charset="2"/>
+              </a:rPr>
+              <a:t>Out – execute till out of current routine</a:t>
+            </a:r>
+          </a:p>
+          <a:p>
+            <a:r>
+              <a:rPr lang="en-US" sz="3600" dirty="0">
+                <a:sym typeface="Wingdings" panose="05000000000000000000" pitchFamily="2" charset="2"/>
+              </a:rPr>
+              <a:t>Quit – quit program debugging </a:t>
+            </a:r>
+          </a:p>
+          <a:p>
+            <a:endParaRPr lang="en-US" sz="3600" dirty="0"/>
+          </a:p>
+        </p:txBody>
+      </p:sp>
+    </p:spTree>
+    <p:extLst>
+      <p:ext uri="{BB962C8B-B14F-4D97-AF65-F5344CB8AC3E}">
+        <p14:creationId xmlns:p14="http://schemas.microsoft.com/office/powerpoint/2010/main" val="53362547"/>
+      </p:ext>
+    </p:extLst>
+  </p:cSld>
+  <p:clrMapOvr>
+    <a:masterClrMapping/>
+  </p:clrMapOvr>
+</p:sld>
+</file>
+
+<file path=ppt/slides/slide17.xml><?xml version="1.0" encoding="utf-8"?>
+<p:sld xmlns:a="http://schemas.openxmlformats.org/drawingml/2006/main" xmlns:r="http://schemas.openxmlformats.org/officeDocument/2006/relationships" xmlns:p="http://schemas.openxmlformats.org/presentationml/2006/main" showMasterSp="0">
+  <p:cSld>
+    <p:spTree>
+      <p:nvGrpSpPr>
+        <p:cNvPr id="1" name=""/>
+        <p:cNvGrpSpPr/>
+        <p:nvPr/>
+      </p:nvGrpSpPr>
+      <p:grpSpPr>
+        <a:xfrm>
+          <a:off x="0" y="0"/>
+          <a:ext cx="0" cy="0"/>
+          <a:chOff x="0" y="0"/>
+          <a:chExt cx="0" cy="0"/>
+        </a:xfrm>
+      </p:grpSpPr>
+      <p:sp>
+        <p:nvSpPr>
+          <p:cNvPr id="2" name="Title 1">
+            <a:extLst>
+              <a:ext uri="{FF2B5EF4-FFF2-40B4-BE49-F238E27FC236}">
+                <a16:creationId xmlns:a16="http://schemas.microsoft.com/office/drawing/2014/main" id="{00C99C45-A655-40FD-BF53-F03EF1F5E416}"/>
+              </a:ext>
+            </a:extLst>
+          </p:cNvPr>
+          <p:cNvSpPr>
+            <a:spLocks noGrp="1"/>
+          </p:cNvSpPr>
+          <p:nvPr>
+            <p:ph type="title"/>
+          </p:nvPr>
+        </p:nvSpPr>
+        <p:spPr/>
+        <p:txBody>
+          <a:bodyPr>
+            <a:normAutofit/>
+          </a:bodyPr>
+          <a:lstStyle/>
+          <a:p>
+            <a:r>
+              <a:rPr lang="en-US" dirty="0"/>
+              <a:t>Debug Control</a:t>
+            </a:r>
+            <a:br>
+              <a:rPr lang="en-US" dirty="0"/>
+            </a:br>
+            <a:r>
+              <a:rPr lang="en-US" dirty="0"/>
+              <a:t> Operation</a:t>
+            </a:r>
+          </a:p>
+        </p:txBody>
+      </p:sp>
+      <p:sp>
+        <p:nvSpPr>
+          <p:cNvPr id="5" name="Footer Placeholder 4">
+            <a:extLst>
+              <a:ext uri="{FF2B5EF4-FFF2-40B4-BE49-F238E27FC236}">
+                <a16:creationId xmlns:a16="http://schemas.microsoft.com/office/drawing/2014/main" id="{EB3CE92E-DA4C-49CE-8437-22304F783D2B}"/>
+              </a:ext>
+            </a:extLst>
+          </p:cNvPr>
+          <p:cNvSpPr>
+            <a:spLocks noGrp="1"/>
+          </p:cNvSpPr>
+          <p:nvPr>
+            <p:ph type="ftr" sz="quarter" idx="11"/>
+          </p:nvPr>
+        </p:nvSpPr>
+        <p:spPr/>
+        <p:txBody>
+          <a:bodyPr/>
+          <a:lstStyle/>
+          <a:p>
+            <a:pPr marL="0" marR="0" lvl="0" indent="0" algn="l" defTabSz="457200" rtl="0" eaLnBrk="1" fontAlgn="auto" latinLnBrk="0" hangingPunct="1">
+              <a:lnSpc>
+                <a:spcPct val="100000"/>
+              </a:lnSpc>
+              <a:spcBef>
+                <a:spcPts val="0"/>
+              </a:spcBef>
+              <a:spcAft>
+                <a:spcPts val="0"/>
+              </a:spcAft>
+              <a:buClrTx/>
+              <a:buSzTx/>
+              <a:buFontTx/>
+              <a:buNone/>
+              <a:tabLst/>
+              <a:defRPr/>
+            </a:pPr>
+            <a:r>
+              <a:rPr kumimoji="0" lang="en-US" sz="900" b="0" i="0" u="none" strike="noStrike" kern="1200" cap="none" spc="0" normalizeH="0" baseline="0" noProof="0" dirty="0">
+                <a:ln>
+                  <a:noFill/>
+                </a:ln>
+                <a:solidFill>
+                  <a:prstClr val="black">
+                    <a:tint val="75000"/>
+                  </a:prstClr>
+                </a:solidFill>
+                <a:effectLst/>
+                <a:uLnTx/>
+                <a:uFillTx/>
+                <a:latin typeface="Trebuchet MS" panose="020B0603020202020204"/>
+                <a:ea typeface="+mn-ea"/>
+                <a:cs typeface="+mn-cs"/>
+              </a:rPr>
+              <a:t>raysmith@alum.mit.edu</a:t>
+            </a:r>
+          </a:p>
+        </p:txBody>
+      </p:sp>
+      <p:sp>
+        <p:nvSpPr>
+          <p:cNvPr id="7" name="Content Placeholder 6">
+            <a:extLst>
+              <a:ext uri="{FF2B5EF4-FFF2-40B4-BE49-F238E27FC236}">
+                <a16:creationId xmlns:a16="http://schemas.microsoft.com/office/drawing/2014/main" id="{E5AD5BCF-A580-42A7-8820-4A0D1990F5E6}"/>
+              </a:ext>
+            </a:extLst>
+          </p:cNvPr>
+          <p:cNvSpPr>
+            <a:spLocks noGrp="1"/>
+          </p:cNvSpPr>
+          <p:nvPr>
+            <p:ph idx="1"/>
+          </p:nvPr>
+        </p:nvSpPr>
+        <p:spPr/>
+        <p:txBody>
+          <a:bodyPr>
             <a:normAutofit/>
           </a:bodyPr>
           <a:lstStyle/>
@@ -14041,7 +14815,7 @@
 </p:sld>
 </file>
 
-<file path=ppt/slides/slide17.xml><?xml version="1.0" encoding="utf-8"?>
+<file path=ppt/slides/slide18.xml><?xml version="1.0" encoding="utf-8"?>
 <p:sld xmlns:a="http://schemas.openxmlformats.org/drawingml/2006/main" xmlns:r="http://schemas.openxmlformats.org/officeDocument/2006/relationships" xmlns:p="http://schemas.openxmlformats.org/presentationml/2006/main" showMasterSp="0">
   <p:cSld>
     <p:spTree>
@@ -14341,7 +15115,7 @@
           <a:p>
             <a:fld id="{A7119916-CD40-456D-ABE3-55F8822671F7}" type="datetime1">
               <a:rPr lang="en-US" smtClean="0"/>
-              <a:t>8/6/2022</a:t>
+              <a:t>10/21/2022</a:t>
             </a:fld>
             <a:endParaRPr lang="en-US" dirty="0"/>
           </a:p>
@@ -14615,7 +15389,7 @@
                 <a:tabLst/>
                 <a:defRPr/>
               </a:pPr>
-              <a:t>8/6/2022</a:t>
+              <a:t>10/21/2022</a:t>
             </a:fld>
             <a:endParaRPr kumimoji="0" lang="en-US" sz="900" b="0" i="0" u="none" strike="noStrike" kern="1200" cap="none" spc="0" normalizeH="0" baseline="0" noProof="0" dirty="0">
               <a:ln>
@@ -14884,6 +15658,13 @@
             </a:r>
           </a:p>
           <a:p>
+            <a:pPr lvl="2"/>
+            <a:r>
+              <a:rPr lang="en-US" sz="3200" dirty="0"/>
+              <a:t>Mouse clicks, time passing</a:t>
+            </a:r>
+          </a:p>
+          <a:p>
             <a:r>
               <a:rPr lang="en-US" sz="3600" dirty="0"/>
               <a:t>Object Oriented</a:t>
@@ -14970,7 +15751,7 @@
                 <a:tabLst/>
                 <a:defRPr/>
               </a:pPr>
-              <a:t>8/6/2022</a:t>
+              <a:t>10/21/2022</a:t>
             </a:fld>
             <a:endParaRPr kumimoji="0" lang="en-US" sz="900" b="0" i="0" u="none" strike="noStrike" kern="1200" cap="none" spc="0" normalizeH="0" baseline="0" noProof="0" dirty="0">
               <a:ln>
@@ -15213,7 +15994,7 @@
             </a:br>
             <a:r>
               <a:rPr lang="en-US" sz="2400" dirty="0"/>
-              <a:t>graphics/my_window.py</a:t>
+              <a:t>exercises/graphics/my_window.py</a:t>
             </a:r>
           </a:p>
         </p:txBody>
@@ -15352,7 +16133,7 @@
                 <a:tabLst/>
                 <a:defRPr/>
               </a:pPr>
-              <a:t>8/6/2022</a:t>
+              <a:t>10/21/2022</a:t>
             </a:fld>
             <a:endParaRPr kumimoji="0" lang="en-US" sz="900" b="0" i="0" u="none" strike="noStrike" kern="1200" cap="none" spc="0" normalizeH="0" baseline="0" noProof="0" dirty="0">
               <a:ln>
@@ -15614,9 +16395,23 @@
             </a:r>
           </a:p>
           <a:p>
+            <a:pPr lvl="1"/>
+            <a:r>
+              <a:rPr lang="en-US" sz="3400" dirty="0"/>
+              <a:t>exercises/graphics/gr_hello.py</a:t>
+            </a:r>
+          </a:p>
+          <a:p>
             <a:r>
               <a:rPr lang="en-US" sz="3600" dirty="0"/>
-              <a:t>graphics/gr_hello.py</a:t>
+              <a:t>Get input</a:t>
+            </a:r>
+          </a:p>
+          <a:p>
+            <a:pPr lvl="1"/>
+            <a:r>
+              <a:rPr lang="en-US" sz="3400" dirty="0"/>
+              <a:t>exercises/graphics/gr</a:t>
             </a:r>
           </a:p>
         </p:txBody>
@@ -15693,7 +16488,7 @@
                 <a:tabLst/>
                 <a:defRPr/>
               </a:pPr>
-              <a:t>8/6/2022</a:t>
+              <a:t>10/21/2022</a:t>
             </a:fld>
             <a:endParaRPr kumimoji="0" lang="en-US" sz="900" b="0" i="0" u="none" strike="noStrike" kern="1200" cap="none" spc="0" normalizeH="0" baseline="0" noProof="0" dirty="0">
               <a:ln>
@@ -16072,7 +16867,7 @@
                 <a:tabLst/>
                 <a:defRPr/>
               </a:pPr>
-              <a:t>8/6/2022</a:t>
+              <a:t>10/21/2022</a:t>
             </a:fld>
             <a:endParaRPr kumimoji="0" lang="en-US" sz="900" b="0" i="0" u="none" strike="noStrike" kern="1200" cap="none" spc="0" normalizeH="0" baseline="0" noProof="0" dirty="0">
               <a:ln>
@@ -16327,7 +17122,7 @@
         <p:spPr>
           <a:xfrm>
             <a:off x="677334" y="1930400"/>
-            <a:ext cx="8832426" cy="4110962"/>
+            <a:ext cx="10082106" cy="4110962"/>
           </a:xfrm>
         </p:spPr>
         <p:txBody>
@@ -16339,7 +17134,7 @@
             <a:pPr marL="971550" lvl="1" indent="-457200"/>
             <a:r>
               <a:rPr lang="en-US" sz="3400" dirty="0"/>
-              <a:t>graphics/tutorial_hello_world.py</a:t>
+              <a:t>exercises/graphics/tutorial_hello_world.py</a:t>
             </a:r>
           </a:p>
         </p:txBody>
@@ -16416,7 +17211,7 @@
                 <a:tabLst/>
                 <a:defRPr/>
               </a:pPr>
-              <a:t>8/6/2022</a:t>
+              <a:t>10/21/2022</a:t>
             </a:fld>
             <a:endParaRPr kumimoji="0" lang="en-US" sz="900" b="0" i="0" u="none" strike="noStrike" kern="1200" cap="none" spc="0" normalizeH="0" baseline="0" noProof="0" dirty="0">
               <a:ln>
@@ -16796,7 +17591,7 @@
                 <a:tabLst/>
                 <a:defRPr/>
               </a:pPr>
-              <a:t>8/6/2022</a:t>
+              <a:t>10/21/2022</a:t>
             </a:fld>
             <a:endParaRPr kumimoji="0" lang="en-US" sz="900" b="0" i="0" u="none" strike="noStrike" kern="1200" cap="none" spc="0" normalizeH="0" baseline="0" noProof="0" dirty="0">
               <a:ln>

</xml_diff>